<commit_message>
Cập nhật bài báo
</commit_message>
<xml_diff>
--- a/Reports/Seminars/SR_Survey_Compare_Methods.pptx
+++ b/Reports/Seminars/SR_Survey_Compare_Methods.pptx
@@ -8,7 +8,8 @@
     <p:sldId id="256" r:id="rId2"/>
     <p:sldId id="258" r:id="rId3"/>
     <p:sldId id="260" r:id="rId4"/>
-    <p:sldId id="259" r:id="rId5"/>
+    <p:sldId id="261" r:id="rId5"/>
+    <p:sldId id="259" r:id="rId6"/>
   </p:sldIdLst>
   <p:sldSz cx="12192000" cy="6858000"/>
   <p:notesSz cx="6858000" cy="9144000"/>
@@ -262,7 +263,7 @@
           <a:p>
             <a:fld id="{7BB57AD2-0D65-4ADB-8B6A-48767B53C6F8}" type="datetimeFigureOut">
               <a:rPr lang="en-US" smtClean="0"/>
-              <a:t>10/28/2023</a:t>
+              <a:t>10/29/2023</a:t>
             </a:fld>
             <a:endParaRPr lang="en-US"/>
           </a:p>
@@ -460,7 +461,7 @@
           <a:p>
             <a:fld id="{7BB57AD2-0D65-4ADB-8B6A-48767B53C6F8}" type="datetimeFigureOut">
               <a:rPr lang="en-US" smtClean="0"/>
-              <a:t>10/28/2023</a:t>
+              <a:t>10/29/2023</a:t>
             </a:fld>
             <a:endParaRPr lang="en-US"/>
           </a:p>
@@ -668,7 +669,7 @@
           <a:p>
             <a:fld id="{7BB57AD2-0D65-4ADB-8B6A-48767B53C6F8}" type="datetimeFigureOut">
               <a:rPr lang="en-US" smtClean="0"/>
-              <a:t>10/28/2023</a:t>
+              <a:t>10/29/2023</a:t>
             </a:fld>
             <a:endParaRPr lang="en-US"/>
           </a:p>
@@ -866,7 +867,7 @@
           <a:p>
             <a:fld id="{7BB57AD2-0D65-4ADB-8B6A-48767B53C6F8}" type="datetimeFigureOut">
               <a:rPr lang="en-US" smtClean="0"/>
-              <a:t>10/28/2023</a:t>
+              <a:t>10/29/2023</a:t>
             </a:fld>
             <a:endParaRPr lang="en-US"/>
           </a:p>
@@ -1141,7 +1142,7 @@
           <a:p>
             <a:fld id="{7BB57AD2-0D65-4ADB-8B6A-48767B53C6F8}" type="datetimeFigureOut">
               <a:rPr lang="en-US" smtClean="0"/>
-              <a:t>10/28/2023</a:t>
+              <a:t>10/29/2023</a:t>
             </a:fld>
             <a:endParaRPr lang="en-US"/>
           </a:p>
@@ -1406,7 +1407,7 @@
           <a:p>
             <a:fld id="{7BB57AD2-0D65-4ADB-8B6A-48767B53C6F8}" type="datetimeFigureOut">
               <a:rPr lang="en-US" smtClean="0"/>
-              <a:t>10/28/2023</a:t>
+              <a:t>10/29/2023</a:t>
             </a:fld>
             <a:endParaRPr lang="en-US"/>
           </a:p>
@@ -1818,7 +1819,7 @@
           <a:p>
             <a:fld id="{7BB57AD2-0D65-4ADB-8B6A-48767B53C6F8}" type="datetimeFigureOut">
               <a:rPr lang="en-US" smtClean="0"/>
-              <a:t>10/28/2023</a:t>
+              <a:t>10/29/2023</a:t>
             </a:fld>
             <a:endParaRPr lang="en-US"/>
           </a:p>
@@ -1959,7 +1960,7 @@
           <a:p>
             <a:fld id="{7BB57AD2-0D65-4ADB-8B6A-48767B53C6F8}" type="datetimeFigureOut">
               <a:rPr lang="en-US" smtClean="0"/>
-              <a:t>10/28/2023</a:t>
+              <a:t>10/29/2023</a:t>
             </a:fld>
             <a:endParaRPr lang="en-US"/>
           </a:p>
@@ -2072,7 +2073,7 @@
           <a:p>
             <a:fld id="{7BB57AD2-0D65-4ADB-8B6A-48767B53C6F8}" type="datetimeFigureOut">
               <a:rPr lang="en-US" smtClean="0"/>
-              <a:t>10/28/2023</a:t>
+              <a:t>10/29/2023</a:t>
             </a:fld>
             <a:endParaRPr lang="en-US"/>
           </a:p>
@@ -2383,7 +2384,7 @@
           <a:p>
             <a:fld id="{7BB57AD2-0D65-4ADB-8B6A-48767B53C6F8}" type="datetimeFigureOut">
               <a:rPr lang="en-US" smtClean="0"/>
-              <a:t>10/28/2023</a:t>
+              <a:t>10/29/2023</a:t>
             </a:fld>
             <a:endParaRPr lang="en-US"/>
           </a:p>
@@ -2671,7 +2672,7 @@
           <a:p>
             <a:fld id="{7BB57AD2-0D65-4ADB-8B6A-48767B53C6F8}" type="datetimeFigureOut">
               <a:rPr lang="en-US" smtClean="0"/>
-              <a:t>10/28/2023</a:t>
+              <a:t>10/29/2023</a:t>
             </a:fld>
             <a:endParaRPr lang="en-US"/>
           </a:p>
@@ -2912,7 +2913,7 @@
           <a:p>
             <a:fld id="{7BB57AD2-0D65-4ADB-8B6A-48767B53C6F8}" type="datetimeFigureOut">
               <a:rPr lang="en-US" smtClean="0"/>
-              <a:t>10/28/2023</a:t>
+              <a:t>10/29/2023</a:t>
             </a:fld>
             <a:endParaRPr lang="en-US"/>
           </a:p>
@@ -4762,7 +4763,448 @@
           <p:nvPr>
             <p:extLst>
               <p:ext uri="{D42A27DB-BD31-4B8C-83A1-F6EECF244321}">
-                <p14:modId xmlns:p14="http://schemas.microsoft.com/office/powerpoint/2010/main" val="2160093459"/>
+                <p14:modId xmlns:p14="http://schemas.microsoft.com/office/powerpoint/2010/main" val="3598346530"/>
+              </p:ext>
+            </p:extLst>
+          </p:nvPr>
+        </p:nvGraphicFramePr>
+        <p:xfrm>
+          <a:off x="0" y="0"/>
+          <a:ext cx="12192000" cy="6858000"/>
+        </p:xfrm>
+        <a:graphic>
+          <a:graphicData uri="http://schemas.openxmlformats.org/drawingml/2006/table">
+            <a:tbl>
+              <a:tblPr firstRow="1" bandRow="1">
+                <a:tableStyleId>{073A0DAA-6AF3-43AB-8588-CEC1D06C72B9}</a:tableStyleId>
+              </a:tblPr>
+              <a:tblGrid>
+                <a:gridCol w="1912690">
+                  <a:extLst>
+                    <a:ext uri="{9D8B030D-6E8A-4147-A177-3AD203B41FA5}">
+                      <a16:colId xmlns:a16="http://schemas.microsoft.com/office/drawing/2014/main" val="1997756814"/>
+                    </a:ext>
+                  </a:extLst>
+                </a:gridCol>
+                <a:gridCol w="3548543">
+                  <a:extLst>
+                    <a:ext uri="{9D8B030D-6E8A-4147-A177-3AD203B41FA5}">
+                      <a16:colId xmlns:a16="http://schemas.microsoft.com/office/drawing/2014/main" val="3351485014"/>
+                    </a:ext>
+                  </a:extLst>
+                </a:gridCol>
+                <a:gridCol w="3598877">
+                  <a:extLst>
+                    <a:ext uri="{9D8B030D-6E8A-4147-A177-3AD203B41FA5}">
+                      <a16:colId xmlns:a16="http://schemas.microsoft.com/office/drawing/2014/main" val="230779267"/>
+                    </a:ext>
+                  </a:extLst>
+                </a:gridCol>
+                <a:gridCol w="3131890">
+                  <a:extLst>
+                    <a:ext uri="{9D8B030D-6E8A-4147-A177-3AD203B41FA5}">
+                      <a16:colId xmlns:a16="http://schemas.microsoft.com/office/drawing/2014/main" val="3494688688"/>
+                    </a:ext>
+                  </a:extLst>
+                </a:gridCol>
+              </a:tblGrid>
+              <a:tr h="1175047">
+                <a:tc>
+                  <a:txBody>
+                    <a:bodyPr/>
+                    <a:lstStyle/>
+                    <a:p>
+                      <a:pPr algn="ctr"/>
+                      <a:r>
+                        <a:rPr lang="en-US"/>
+                        <a:t>Works</a:t>
+                      </a:r>
+                    </a:p>
+                  </a:txBody>
+                  <a:tcPr anchor="ctr"/>
+                </a:tc>
+                <a:tc>
+                  <a:txBody>
+                    <a:bodyPr/>
+                    <a:lstStyle/>
+                    <a:p>
+                      <a:pPr algn="ctr"/>
+                      <a:r>
+                        <a:rPr lang="en-US"/>
+                        <a:t>Inputs</a:t>
+                      </a:r>
+                    </a:p>
+                  </a:txBody>
+                  <a:tcPr anchor="ctr"/>
+                </a:tc>
+                <a:tc>
+                  <a:txBody>
+                    <a:bodyPr/>
+                    <a:lstStyle/>
+                    <a:p>
+                      <a:pPr algn="ctr"/>
+                      <a:r>
+                        <a:rPr lang="en-US"/>
+                        <a:t>Outputs</a:t>
+                      </a:r>
+                    </a:p>
+                  </a:txBody>
+                  <a:tcPr anchor="ctr"/>
+                </a:tc>
+                <a:tc>
+                  <a:txBody>
+                    <a:bodyPr/>
+                    <a:lstStyle/>
+                    <a:p>
+                      <a:pPr algn="ctr"/>
+                      <a:r>
+                        <a:rPr lang="en-US"/>
+                        <a:t>Note</a:t>
+                      </a:r>
+                    </a:p>
+                  </a:txBody>
+                  <a:tcPr anchor="ctr"/>
+                </a:tc>
+                <a:extLst>
+                  <a:ext uri="{0D108BD9-81ED-4DB2-BD59-A6C34878D82A}">
+                    <a16:rowId xmlns:a16="http://schemas.microsoft.com/office/drawing/2014/main" val="2286173187"/>
+                  </a:ext>
+                </a:extLst>
+              </a:tr>
+              <a:tr h="5682953">
+                <a:tc>
+                  <a:txBody>
+                    <a:bodyPr/>
+                    <a:lstStyle/>
+                    <a:p>
+                      <a:pPr algn="ctr"/>
+                      <a:r>
+                        <a:rPr lang="en-US"/>
+                        <a:t>BSRGAN</a:t>
+                      </a:r>
+                    </a:p>
+                  </a:txBody>
+                  <a:tcPr anchor="ctr"/>
+                </a:tc>
+                <a:tc>
+                  <a:txBody>
+                    <a:bodyPr/>
+                    <a:lstStyle/>
+                    <a:p>
+                      <a:pPr algn="ctr"/>
+                      <a:endParaRPr lang="en-US"/>
+                    </a:p>
+                  </a:txBody>
+                  <a:tcPr anchor="ctr"/>
+                </a:tc>
+                <a:tc>
+                  <a:txBody>
+                    <a:bodyPr/>
+                    <a:lstStyle/>
+                    <a:p>
+                      <a:pPr algn="ctr"/>
+                      <a:endParaRPr lang="en-US"/>
+                    </a:p>
+                  </a:txBody>
+                  <a:tcPr anchor="ctr"/>
+                </a:tc>
+                <a:tc>
+                  <a:txBody>
+                    <a:bodyPr/>
+                    <a:lstStyle/>
+                    <a:p>
+                      <a:pPr marL="285750" indent="-285750" algn="l">
+                        <a:buFontTx/>
+                        <a:buChar char="-"/>
+                      </a:pPr>
+                      <a:r>
+                        <a:rPr lang="en-US" altLang="zh-TW" sz="1800" b="0" i="0" kern="1200">
+                          <a:solidFill>
+                            <a:schemeClr val="dk1"/>
+                          </a:solidFill>
+                          <a:effectLst/>
+                          <a:latin typeface="+mn-lt"/>
+                          <a:ea typeface="+mn-ea"/>
+                          <a:cs typeface="+mn-cs"/>
+                        </a:rPr>
+                        <a:t>Designing a Practical Degradation Model for Deep Blind Image Super-Resolution (ICCV, 2021) (PyTorch) - We released the training code! (Kai Zhang, Jingyun Liang, Luc Van Gool, Radu Timofte - Computer Vision Lab, ETH Zurich, Switzerland)</a:t>
+                      </a:r>
+                    </a:p>
+                  </a:txBody>
+                  <a:tcPr anchor="ctr"/>
+                </a:tc>
+                <a:extLst>
+                  <a:ext uri="{0D108BD9-81ED-4DB2-BD59-A6C34878D82A}">
+                    <a16:rowId xmlns:a16="http://schemas.microsoft.com/office/drawing/2014/main" val="2001578238"/>
+                  </a:ext>
+                </a:extLst>
+              </a:tr>
+            </a:tbl>
+          </a:graphicData>
+        </a:graphic>
+      </p:graphicFrame>
+      <p:pic>
+        <p:nvPicPr>
+          <p:cNvPr id="16" name="Picture 15">
+            <a:extLst>
+              <a:ext uri="{FF2B5EF4-FFF2-40B4-BE49-F238E27FC236}">
+                <a16:creationId xmlns:a16="http://schemas.microsoft.com/office/drawing/2014/main" id="{21C4DD06-8094-4EF5-ADE9-CB723DE90412}"/>
+              </a:ext>
+            </a:extLst>
+          </p:cNvPr>
+          <p:cNvPicPr>
+            <a:picLocks noChangeAspect="1"/>
+          </p:cNvPicPr>
+          <p:nvPr/>
+        </p:nvPicPr>
+        <p:blipFill>
+          <a:blip r:embed="rId2">
+            <a:extLst>
+              <a:ext uri="{28A0092B-C50C-407E-A947-70E740481C1C}">
+                <a14:useLocalDpi xmlns:a14="http://schemas.microsoft.com/office/drawing/2010/main" val="0"/>
+              </a:ext>
+            </a:extLst>
+          </a:blip>
+          <a:stretch>
+            <a:fillRect/>
+          </a:stretch>
+        </p:blipFill>
+        <p:spPr>
+          <a:xfrm>
+            <a:off x="2001441" y="3136455"/>
+            <a:ext cx="3386473" cy="1315135"/>
+          </a:xfrm>
+          <a:prstGeom prst="rect">
+            <a:avLst/>
+          </a:prstGeom>
+        </p:spPr>
+      </p:pic>
+      <p:pic>
+        <p:nvPicPr>
+          <p:cNvPr id="18" name="Picture 17">
+            <a:extLst>
+              <a:ext uri="{FF2B5EF4-FFF2-40B4-BE49-F238E27FC236}">
+                <a16:creationId xmlns:a16="http://schemas.microsoft.com/office/drawing/2014/main" id="{45DCFD35-F0BD-4EEE-BD57-8A26340771C6}"/>
+              </a:ext>
+            </a:extLst>
+          </p:cNvPr>
+          <p:cNvPicPr>
+            <a:picLocks noChangeAspect="1"/>
+          </p:cNvPicPr>
+          <p:nvPr/>
+        </p:nvPicPr>
+        <p:blipFill>
+          <a:blip r:embed="rId3">
+            <a:extLst>
+              <a:ext uri="{28A0092B-C50C-407E-A947-70E740481C1C}">
+                <a14:useLocalDpi xmlns:a14="http://schemas.microsoft.com/office/drawing/2010/main" val="0"/>
+              </a:ext>
+            </a:extLst>
+          </a:blip>
+          <a:stretch>
+            <a:fillRect/>
+          </a:stretch>
+        </p:blipFill>
+        <p:spPr>
+          <a:xfrm>
+            <a:off x="2898876" y="4879109"/>
+            <a:ext cx="1471044" cy="1828866"/>
+          </a:xfrm>
+          <a:prstGeom prst="rect">
+            <a:avLst/>
+          </a:prstGeom>
+        </p:spPr>
+      </p:pic>
+      <p:pic>
+        <p:nvPicPr>
+          <p:cNvPr id="20" name="Picture 19">
+            <a:extLst>
+              <a:ext uri="{FF2B5EF4-FFF2-40B4-BE49-F238E27FC236}">
+                <a16:creationId xmlns:a16="http://schemas.microsoft.com/office/drawing/2014/main" id="{63AD4677-33D2-4F1E-9CD2-6BEB1AD8D4F3}"/>
+              </a:ext>
+            </a:extLst>
+          </p:cNvPr>
+          <p:cNvPicPr>
+            <a:picLocks noChangeAspect="1"/>
+          </p:cNvPicPr>
+          <p:nvPr/>
+        </p:nvPicPr>
+        <p:blipFill>
+          <a:blip r:embed="rId4">
+            <a:extLst>
+              <a:ext uri="{28A0092B-C50C-407E-A947-70E740481C1C}">
+                <a14:useLocalDpi xmlns:a14="http://schemas.microsoft.com/office/drawing/2010/main" val="0"/>
+              </a:ext>
+            </a:extLst>
+          </a:blip>
+          <a:stretch>
+            <a:fillRect/>
+          </a:stretch>
+        </p:blipFill>
+        <p:spPr>
+          <a:xfrm>
+            <a:off x="2001442" y="1291256"/>
+            <a:ext cx="3386472" cy="1631439"/>
+          </a:xfrm>
+          <a:prstGeom prst="rect">
+            <a:avLst/>
+          </a:prstGeom>
+        </p:spPr>
+      </p:pic>
+      <p:pic>
+        <p:nvPicPr>
+          <p:cNvPr id="5" name="Picture 4">
+            <a:extLst>
+              <a:ext uri="{FF2B5EF4-FFF2-40B4-BE49-F238E27FC236}">
+                <a16:creationId xmlns:a16="http://schemas.microsoft.com/office/drawing/2014/main" id="{711045B3-6ED6-4AD7-AF84-138648BE65E4}"/>
+              </a:ext>
+            </a:extLst>
+          </p:cNvPr>
+          <p:cNvPicPr>
+            <a:picLocks noChangeAspect="1"/>
+          </p:cNvPicPr>
+          <p:nvPr/>
+        </p:nvPicPr>
+        <p:blipFill>
+          <a:blip r:embed="rId5">
+            <a:extLst>
+              <a:ext uri="{28A0092B-C50C-407E-A947-70E740481C1C}">
+                <a14:useLocalDpi xmlns:a14="http://schemas.microsoft.com/office/drawing/2010/main" val="0"/>
+              </a:ext>
+            </a:extLst>
+          </a:blip>
+          <a:stretch>
+            <a:fillRect/>
+          </a:stretch>
+        </p:blipFill>
+        <p:spPr>
+          <a:xfrm>
+            <a:off x="5587665" y="1291256"/>
+            <a:ext cx="3386472" cy="1631439"/>
+          </a:xfrm>
+          <a:prstGeom prst="rect">
+            <a:avLst/>
+          </a:prstGeom>
+        </p:spPr>
+      </p:pic>
+      <p:pic>
+        <p:nvPicPr>
+          <p:cNvPr id="8" name="Picture 7">
+            <a:extLst>
+              <a:ext uri="{FF2B5EF4-FFF2-40B4-BE49-F238E27FC236}">
+                <a16:creationId xmlns:a16="http://schemas.microsoft.com/office/drawing/2014/main" id="{62ADEAB1-A4D2-46FC-9206-3E035772C74E}"/>
+              </a:ext>
+            </a:extLst>
+          </p:cNvPr>
+          <p:cNvPicPr>
+            <a:picLocks noChangeAspect="1"/>
+          </p:cNvPicPr>
+          <p:nvPr/>
+        </p:nvPicPr>
+        <p:blipFill>
+          <a:blip r:embed="rId6">
+            <a:extLst>
+              <a:ext uri="{28A0092B-C50C-407E-A947-70E740481C1C}">
+                <a14:useLocalDpi xmlns:a14="http://schemas.microsoft.com/office/drawing/2010/main" val="0"/>
+              </a:ext>
+            </a:extLst>
+          </a:blip>
+          <a:stretch>
+            <a:fillRect/>
+          </a:stretch>
+        </p:blipFill>
+        <p:spPr>
+          <a:xfrm>
+            <a:off x="5587665" y="3173306"/>
+            <a:ext cx="3386473" cy="1315135"/>
+          </a:xfrm>
+          <a:prstGeom prst="rect">
+            <a:avLst/>
+          </a:prstGeom>
+        </p:spPr>
+      </p:pic>
+      <p:pic>
+        <p:nvPicPr>
+          <p:cNvPr id="11" name="Picture 10">
+            <a:extLst>
+              <a:ext uri="{FF2B5EF4-FFF2-40B4-BE49-F238E27FC236}">
+                <a16:creationId xmlns:a16="http://schemas.microsoft.com/office/drawing/2014/main" id="{21B865D3-B00A-4A77-9B28-A5D7534DF083}"/>
+              </a:ext>
+            </a:extLst>
+          </p:cNvPr>
+          <p:cNvPicPr>
+            <a:picLocks noChangeAspect="1"/>
+          </p:cNvPicPr>
+          <p:nvPr/>
+        </p:nvPicPr>
+        <p:blipFill>
+          <a:blip r:embed="rId7">
+            <a:extLst>
+              <a:ext uri="{28A0092B-C50C-407E-A947-70E740481C1C}">
+                <a14:useLocalDpi xmlns:a14="http://schemas.microsoft.com/office/drawing/2010/main" val="0"/>
+              </a:ext>
+            </a:extLst>
+          </a:blip>
+          <a:stretch>
+            <a:fillRect/>
+          </a:stretch>
+        </p:blipFill>
+        <p:spPr>
+          <a:xfrm>
+            <a:off x="6412382" y="4917242"/>
+            <a:ext cx="1409700" cy="1752600"/>
+          </a:xfrm>
+          <a:prstGeom prst="rect">
+            <a:avLst/>
+          </a:prstGeom>
+        </p:spPr>
+      </p:pic>
+    </p:spTree>
+    <p:extLst>
+      <p:ext uri="{BB962C8B-B14F-4D97-AF65-F5344CB8AC3E}">
+        <p14:creationId xmlns:p14="http://schemas.microsoft.com/office/powerpoint/2010/main" val="188785000"/>
+      </p:ext>
+    </p:extLst>
+  </p:cSld>
+  <p:clrMapOvr>
+    <a:masterClrMapping/>
+  </p:clrMapOvr>
+</p:sld>
+</file>
+
+<file path=ppt/slides/slide5.xml><?xml version="1.0" encoding="utf-8"?>
+<p:sld xmlns:a="http://schemas.openxmlformats.org/drawingml/2006/main" xmlns:r="http://schemas.openxmlformats.org/officeDocument/2006/relationships" xmlns:p="http://schemas.openxmlformats.org/presentationml/2006/main">
+  <p:cSld>
+    <p:spTree>
+      <p:nvGrpSpPr>
+        <p:cNvPr id="1" name=""/>
+        <p:cNvGrpSpPr/>
+        <p:nvPr/>
+      </p:nvGrpSpPr>
+      <p:grpSpPr>
+        <a:xfrm>
+          <a:off x="0" y="0"/>
+          <a:ext cx="0" cy="0"/>
+          <a:chOff x="0" y="0"/>
+          <a:chExt cx="0" cy="0"/>
+        </a:xfrm>
+      </p:grpSpPr>
+      <p:graphicFrame>
+        <p:nvGraphicFramePr>
+          <p:cNvPr id="4" name="Table 3">
+            <a:extLst>
+              <a:ext uri="{FF2B5EF4-FFF2-40B4-BE49-F238E27FC236}">
+                <a16:creationId xmlns:a16="http://schemas.microsoft.com/office/drawing/2014/main" id="{45EFB6CF-5FC1-4464-82AF-C8BE2730DEAE}"/>
+              </a:ext>
+            </a:extLst>
+          </p:cNvPr>
+          <p:cNvGraphicFramePr>
+            <a:graphicFrameLocks noGrp="1"/>
+          </p:cNvGraphicFramePr>
+          <p:nvPr>
+            <p:extLst>
+              <p:ext uri="{D42A27DB-BD31-4B8C-83A1-F6EECF244321}">
+                <p14:modId xmlns:p14="http://schemas.microsoft.com/office/powerpoint/2010/main" val="838483622"/>
               </p:ext>
             </p:extLst>
           </p:nvPr>
@@ -4913,7 +5355,10 @@
                     <a:lstStyle/>
                     <a:p>
                       <a:pPr algn="ctr"/>
-                      <a:endParaRPr lang="en-US"/>
+                      <a:r>
+                        <a:rPr lang="en-US"/>
+                        <a:t>- Năm 2021</a:t>
+                      </a:r>
                     </a:p>
                   </a:txBody>
                   <a:tcPr anchor="ctr"/>

</xml_diff>